<commit_message>
20210412 Add audio controller.
</commit_message>
<xml_diff>
--- a/src/pic/icon.pptx
+++ b/src/pic/icon.pptx
@@ -104,6 +104,11 @@
       </a:defRPr>
     </a:lvl9pPr>
   </p:defaultTextStyle>
+  <p:extLst>
+    <p:ext uri="{EFAFB233-063F-42B5-8137-9DF3F51BA10A}">
+      <p15:sldGuideLst xmlns:p15="http://schemas.microsoft.com/office/powerpoint/2012/main"/>
+    </p:ext>
+  </p:extLst>
 </p:presentation>
 </file>
 
@@ -254,7 +259,7 @@
           <a:p>
             <a:fld id="{19B9FFC9-6858-4CA3-868A-A5EDFEB6D2B5}" type="datetimeFigureOut">
               <a:rPr lang="zh-TW" altLang="en-US" smtClean="0"/>
-              <a:t>2021/4/11</a:t>
+              <a:t>2021/4/12</a:t>
             </a:fld>
             <a:endParaRPr lang="zh-TW" altLang="en-US"/>
           </a:p>
@@ -452,7 +457,7 @@
           <a:p>
             <a:fld id="{19B9FFC9-6858-4CA3-868A-A5EDFEB6D2B5}" type="datetimeFigureOut">
               <a:rPr lang="zh-TW" altLang="en-US" smtClean="0"/>
-              <a:t>2021/4/11</a:t>
+              <a:t>2021/4/12</a:t>
             </a:fld>
             <a:endParaRPr lang="zh-TW" altLang="en-US"/>
           </a:p>
@@ -660,7 +665,7 @@
           <a:p>
             <a:fld id="{19B9FFC9-6858-4CA3-868A-A5EDFEB6D2B5}" type="datetimeFigureOut">
               <a:rPr lang="zh-TW" altLang="en-US" smtClean="0"/>
-              <a:t>2021/4/11</a:t>
+              <a:t>2021/4/12</a:t>
             </a:fld>
             <a:endParaRPr lang="zh-TW" altLang="en-US"/>
           </a:p>
@@ -858,7 +863,7 @@
           <a:p>
             <a:fld id="{19B9FFC9-6858-4CA3-868A-A5EDFEB6D2B5}" type="datetimeFigureOut">
               <a:rPr lang="zh-TW" altLang="en-US" smtClean="0"/>
-              <a:t>2021/4/11</a:t>
+              <a:t>2021/4/12</a:t>
             </a:fld>
             <a:endParaRPr lang="zh-TW" altLang="en-US"/>
           </a:p>
@@ -1133,7 +1138,7 @@
           <a:p>
             <a:fld id="{19B9FFC9-6858-4CA3-868A-A5EDFEB6D2B5}" type="datetimeFigureOut">
               <a:rPr lang="zh-TW" altLang="en-US" smtClean="0"/>
-              <a:t>2021/4/11</a:t>
+              <a:t>2021/4/12</a:t>
             </a:fld>
             <a:endParaRPr lang="zh-TW" altLang="en-US"/>
           </a:p>
@@ -1398,7 +1403,7 @@
           <a:p>
             <a:fld id="{19B9FFC9-6858-4CA3-868A-A5EDFEB6D2B5}" type="datetimeFigureOut">
               <a:rPr lang="zh-TW" altLang="en-US" smtClean="0"/>
-              <a:t>2021/4/11</a:t>
+              <a:t>2021/4/12</a:t>
             </a:fld>
             <a:endParaRPr lang="zh-TW" altLang="en-US"/>
           </a:p>
@@ -1810,7 +1815,7 @@
           <a:p>
             <a:fld id="{19B9FFC9-6858-4CA3-868A-A5EDFEB6D2B5}" type="datetimeFigureOut">
               <a:rPr lang="zh-TW" altLang="en-US" smtClean="0"/>
-              <a:t>2021/4/11</a:t>
+              <a:t>2021/4/12</a:t>
             </a:fld>
             <a:endParaRPr lang="zh-TW" altLang="en-US"/>
           </a:p>
@@ -1951,7 +1956,7 @@
           <a:p>
             <a:fld id="{19B9FFC9-6858-4CA3-868A-A5EDFEB6D2B5}" type="datetimeFigureOut">
               <a:rPr lang="zh-TW" altLang="en-US" smtClean="0"/>
-              <a:t>2021/4/11</a:t>
+              <a:t>2021/4/12</a:t>
             </a:fld>
             <a:endParaRPr lang="zh-TW" altLang="en-US"/>
           </a:p>
@@ -2064,7 +2069,7 @@
           <a:p>
             <a:fld id="{19B9FFC9-6858-4CA3-868A-A5EDFEB6D2B5}" type="datetimeFigureOut">
               <a:rPr lang="zh-TW" altLang="en-US" smtClean="0"/>
-              <a:t>2021/4/11</a:t>
+              <a:t>2021/4/12</a:t>
             </a:fld>
             <a:endParaRPr lang="zh-TW" altLang="en-US"/>
           </a:p>
@@ -2375,7 +2380,7 @@
           <a:p>
             <a:fld id="{19B9FFC9-6858-4CA3-868A-A5EDFEB6D2B5}" type="datetimeFigureOut">
               <a:rPr lang="zh-TW" altLang="en-US" smtClean="0"/>
-              <a:t>2021/4/11</a:t>
+              <a:t>2021/4/12</a:t>
             </a:fld>
             <a:endParaRPr lang="zh-TW" altLang="en-US"/>
           </a:p>
@@ -2663,7 +2668,7 @@
           <a:p>
             <a:fld id="{19B9FFC9-6858-4CA3-868A-A5EDFEB6D2B5}" type="datetimeFigureOut">
               <a:rPr lang="zh-TW" altLang="en-US" smtClean="0"/>
-              <a:t>2021/4/11</a:t>
+              <a:t>2021/4/12</a:t>
             </a:fld>
             <a:endParaRPr lang="zh-TW" altLang="en-US"/>
           </a:p>
@@ -2904,7 +2909,7 @@
           <a:p>
             <a:fld id="{19B9FFC9-6858-4CA3-868A-A5EDFEB6D2B5}" type="datetimeFigureOut">
               <a:rPr lang="zh-TW" altLang="en-US" smtClean="0"/>
-              <a:t>2021/4/11</a:t>
+              <a:t>2021/4/12</a:t>
             </a:fld>
             <a:endParaRPr lang="zh-TW" altLang="en-US"/>
           </a:p>
@@ -3604,6 +3609,131 @@
           </p:txBody>
         </p:sp>
       </p:grpSp>
+      <p:grpSp>
+        <p:nvGrpSpPr>
+          <p:cNvPr id="3" name="群組 2">
+            <a:extLst>
+              <a:ext uri="{FF2B5EF4-FFF2-40B4-BE49-F238E27FC236}">
+                <a16:creationId xmlns:a16="http://schemas.microsoft.com/office/drawing/2014/main" id="{8B7046B0-9015-458B-9A95-C1D36372E798}"/>
+              </a:ext>
+            </a:extLst>
+          </p:cNvPr>
+          <p:cNvGrpSpPr/>
+          <p:nvPr/>
+        </p:nvGrpSpPr>
+        <p:grpSpPr>
+          <a:xfrm>
+            <a:off x="2463952" y="1314107"/>
+            <a:ext cx="308895" cy="300104"/>
+            <a:chOff x="2463952" y="1314107"/>
+            <a:chExt cx="308895" cy="300104"/>
+          </a:xfrm>
+        </p:grpSpPr>
+        <p:sp>
+          <p:nvSpPr>
+            <p:cNvPr id="2" name="矩形: 圓角 1">
+              <a:extLst>
+                <a:ext uri="{FF2B5EF4-FFF2-40B4-BE49-F238E27FC236}">
+                  <a16:creationId xmlns:a16="http://schemas.microsoft.com/office/drawing/2014/main" id="{68654F4C-AE83-42B7-B502-791524CBCA95}"/>
+                </a:ext>
+              </a:extLst>
+            </p:cNvPr>
+            <p:cNvSpPr/>
+            <p:nvPr/>
+          </p:nvSpPr>
+          <p:spPr>
+            <a:xfrm>
+              <a:off x="2463952" y="1314108"/>
+              <a:ext cx="120460" cy="300103"/>
+            </a:xfrm>
+            <a:prstGeom prst="roundRect">
+              <a:avLst/>
+            </a:prstGeom>
+            <a:solidFill>
+              <a:srgbClr val="6A809A"/>
+            </a:solidFill>
+            <a:ln>
+              <a:noFill/>
+            </a:ln>
+          </p:spPr>
+          <p:style>
+            <a:lnRef idx="2">
+              <a:schemeClr val="accent1">
+                <a:shade val="50000"/>
+              </a:schemeClr>
+            </a:lnRef>
+            <a:fillRef idx="1">
+              <a:schemeClr val="accent1"/>
+            </a:fillRef>
+            <a:effectRef idx="0">
+              <a:schemeClr val="accent1"/>
+            </a:effectRef>
+            <a:fontRef idx="minor">
+              <a:schemeClr val="lt1"/>
+            </a:fontRef>
+          </p:style>
+          <p:txBody>
+            <a:bodyPr rtlCol="0" anchor="ctr"/>
+            <a:lstStyle/>
+            <a:p>
+              <a:pPr algn="ctr"/>
+              <a:endParaRPr lang="zh-TW" altLang="en-US"/>
+            </a:p>
+          </p:txBody>
+        </p:sp>
+        <p:sp>
+          <p:nvSpPr>
+            <p:cNvPr id="9" name="矩形: 圓角 8">
+              <a:extLst>
+                <a:ext uri="{FF2B5EF4-FFF2-40B4-BE49-F238E27FC236}">
+                  <a16:creationId xmlns:a16="http://schemas.microsoft.com/office/drawing/2014/main" id="{9C67B151-D391-4820-ABB1-28271335E45F}"/>
+                </a:ext>
+              </a:extLst>
+            </p:cNvPr>
+            <p:cNvSpPr/>
+            <p:nvPr/>
+          </p:nvSpPr>
+          <p:spPr>
+            <a:xfrm>
+              <a:off x="2652387" y="1314107"/>
+              <a:ext cx="120460" cy="300103"/>
+            </a:xfrm>
+            <a:prstGeom prst="roundRect">
+              <a:avLst/>
+            </a:prstGeom>
+            <a:solidFill>
+              <a:srgbClr val="6A809A"/>
+            </a:solidFill>
+            <a:ln>
+              <a:noFill/>
+            </a:ln>
+          </p:spPr>
+          <p:style>
+            <a:lnRef idx="2">
+              <a:schemeClr val="accent1">
+                <a:shade val="50000"/>
+              </a:schemeClr>
+            </a:lnRef>
+            <a:fillRef idx="1">
+              <a:schemeClr val="accent1"/>
+            </a:fillRef>
+            <a:effectRef idx="0">
+              <a:schemeClr val="accent1"/>
+            </a:effectRef>
+            <a:fontRef idx="minor">
+              <a:schemeClr val="lt1"/>
+            </a:fontRef>
+          </p:style>
+          <p:txBody>
+            <a:bodyPr rtlCol="0" anchor="ctr"/>
+            <a:lstStyle/>
+            <a:p>
+              <a:pPr algn="ctr"/>
+              <a:endParaRPr lang="zh-TW" altLang="en-US"/>
+            </a:p>
+          </p:txBody>
+        </p:sp>
+      </p:grpSp>
     </p:spTree>
     <p:extLst>
       <p:ext uri="{BB962C8B-B14F-4D97-AF65-F5344CB8AC3E}">

</xml_diff>